<commit_message>
Final push for presentation
</commit_message>
<xml_diff>
--- a/PresentationSlides_EmmetTracey17201032_DanielOByrne17205389_EoinLeMasney17205791_ConorLawlor17203166.pptx
+++ b/PresentationSlides_EmmetTracey17201032_DanielOByrne17205389_EoinLeMasney17205791_ConorLawlor17203166.pptx
@@ -5923,7 +5923,7 @@
             <a:pPr lvl="1"/>
             <a:r>
               <a:rPr lang="en-US" dirty="0"/>
-              <a:t>Time – hour, day, month etc.</a:t>
+              <a:t>Datetime</a:t>
             </a:r>
           </a:p>
           <a:p>
@@ -6257,7 +6257,7 @@
             </a:pPr>
             <a:r>
               <a:rPr lang="en-US" dirty="0"/>
-              <a:t>This preparation allowed us to explore the data</a:t>
+              <a:t>This preparation allowed us to explore the data further</a:t>
             </a:r>
           </a:p>
           <a:p>

</xml_diff>